<commit_message>
Update week 13 lab
</commit_message>
<xml_diff>
--- a/Week 13/Lab10_Grimm.pptx
+++ b/Week 13/Lab10_Grimm.pptx
@@ -15070,7 +15070,11 @@
             </a:pPr>
             <a:r>
               <a:rPr lang="en-US" dirty="0"/>
-              <a:t>The Dog House should invest in advertising on the following platforms:</a:t>
+              <a:t>The Dog House should invest in advertising on the following </a:t>
+            </a:r>
+            <a:r>
+              <a:rPr lang="en-US"/>
+              <a:t>platforms:</a:t>
             </a:r>
           </a:p>
           <a:p>
@@ -15089,6 +15093,21 @@
             <a:r>
               <a:rPr lang="en-US" dirty="0"/>
               <a:t>Instagram</a:t>
+            </a:r>
+          </a:p>
+          <a:p>
+            <a:pPr marL="68580" indent="0">
+              <a:buNone/>
+            </a:pPr>
+            <a:endParaRPr lang="en-US" dirty="0"/>
+          </a:p>
+          <a:p>
+            <a:pPr marL="68580" indent="0">
+              <a:buNone/>
+            </a:pPr>
+            <a:r>
+              <a:rPr lang="en-US" dirty="0"/>
+              <a:t>Additionally, it is recommended to add an Instagram button to the website along with the Facebook button.</a:t>
             </a:r>
           </a:p>
         </p:txBody>

</xml_diff>